<commit_message>
malloc lab slides 7/21/20
</commit_message>
<xml_diff>
--- a/cs449_lab_7_21_20_and_7_23_20.pptx
+++ b/cs449_lab_7_21_20_and_7_23_20.pptx
@@ -3765,7 +3765,7 @@
         <p:spPr>
           <a:xfrm>
             <a:off x="-148856" y="768071"/>
-            <a:ext cx="8607056" cy="2677656"/>
+            <a:ext cx="8607056" cy="3416320"/>
           </a:xfrm>
           <a:prstGeom prst="rect">
             <a:avLst/>
@@ -3835,6 +3835,21 @@
             <a:r>
               <a:rPr lang="en-US" sz="2400" dirty="0"/>
               <a:t>Lab handout</a:t>
+            </a:r>
+          </a:p>
+          <a:p>
+            <a:pPr lvl="1"/>
+            <a:r>
+              <a:rPr lang="en-US" sz="2400" dirty="0"/>
+              <a:t>Please see </a:t>
+            </a:r>
+            <a:r>
+              <a:rPr lang="en-US" sz="2400" dirty="0" err="1"/>
+              <a:t>Github</a:t>
+            </a:r>
+            <a:r>
+              <a:rPr lang="en-US" sz="2400" dirty="0"/>
+              <a:t> for some additional slides from the professor – these might be covered in the future if time permits.</a:t>
             </a:r>
           </a:p>
         </p:txBody>
@@ -5408,23 +5423,7 @@
                   <a:srgbClr val="002060"/>
                 </a:solidFill>
               </a:rPr>
-              <a:t>: Maximizing the ratio of allocated/total </a:t>
-            </a:r>
-            <a:r>
-              <a:rPr lang="en-US" sz="2000">
-                <a:solidFill>
-                  <a:srgbClr val="002060"/>
-                </a:solidFill>
-              </a:rPr>
-              <a:t>memory -- degraded </a:t>
-            </a:r>
-            <a:r>
-              <a:rPr lang="en-US" sz="2000" dirty="0">
-                <a:solidFill>
-                  <a:srgbClr val="002060"/>
-                </a:solidFill>
-              </a:rPr>
-              <a:t>through fragmentation.</a:t>
+              <a:t>: Maximizing the ratio of allocated/total memory -- degraded through fragmentation.</a:t>
             </a:r>
           </a:p>
           <a:p>

</xml_diff>